<commit_message>
backend testing, 2차 발표자료
</commit_message>
<xml_diff>
--- a/보고서_발표자료/1차/Vintage Focus 1차 발표자료.pptx
+++ b/보고서_발표자료/1차/Vintage Focus 1차 발표자료.pptx
@@ -247,7 +247,7 @@
           <a:p>
             <a:fld id="{4E46A2C9-9894-4DF2-AF4D-870EB97B91ED}" type="datetimeFigureOut">
               <a:rPr lang="ko-KR" altLang="en-US" smtClean="0"/>
-              <a:t>2025-02-19</a:t>
+              <a:t>2025-02-24</a:t>
             </a:fld>
             <a:endParaRPr lang="ko-KR" altLang="en-US"/>
           </a:p>
@@ -417,7 +417,7 @@
           <a:p>
             <a:fld id="{4E46A2C9-9894-4DF2-AF4D-870EB97B91ED}" type="datetimeFigureOut">
               <a:rPr lang="ko-KR" altLang="en-US" smtClean="0"/>
-              <a:t>2025-02-19</a:t>
+              <a:t>2025-02-24</a:t>
             </a:fld>
             <a:endParaRPr lang="ko-KR" altLang="en-US"/>
           </a:p>
@@ -597,7 +597,7 @@
           <a:p>
             <a:fld id="{4E46A2C9-9894-4DF2-AF4D-870EB97B91ED}" type="datetimeFigureOut">
               <a:rPr lang="ko-KR" altLang="en-US" smtClean="0"/>
-              <a:t>2025-02-19</a:t>
+              <a:t>2025-02-24</a:t>
             </a:fld>
             <a:endParaRPr lang="ko-KR" altLang="en-US"/>
           </a:p>
@@ -767,7 +767,7 @@
           <a:p>
             <a:fld id="{4E46A2C9-9894-4DF2-AF4D-870EB97B91ED}" type="datetimeFigureOut">
               <a:rPr lang="ko-KR" altLang="en-US" smtClean="0"/>
-              <a:t>2025-02-19</a:t>
+              <a:t>2025-02-24</a:t>
             </a:fld>
             <a:endParaRPr lang="ko-KR" altLang="en-US"/>
           </a:p>
@@ -1013,7 +1013,7 @@
           <a:p>
             <a:fld id="{4E46A2C9-9894-4DF2-AF4D-870EB97B91ED}" type="datetimeFigureOut">
               <a:rPr lang="ko-KR" altLang="en-US" smtClean="0"/>
-              <a:t>2025-02-19</a:t>
+              <a:t>2025-02-24</a:t>
             </a:fld>
             <a:endParaRPr lang="ko-KR" altLang="en-US"/>
           </a:p>
@@ -1245,7 +1245,7 @@
           <a:p>
             <a:fld id="{4E46A2C9-9894-4DF2-AF4D-870EB97B91ED}" type="datetimeFigureOut">
               <a:rPr lang="ko-KR" altLang="en-US" smtClean="0"/>
-              <a:t>2025-02-19</a:t>
+              <a:t>2025-02-24</a:t>
             </a:fld>
             <a:endParaRPr lang="ko-KR" altLang="en-US"/>
           </a:p>
@@ -1612,7 +1612,7 @@
           <a:p>
             <a:fld id="{4E46A2C9-9894-4DF2-AF4D-870EB97B91ED}" type="datetimeFigureOut">
               <a:rPr lang="ko-KR" altLang="en-US" smtClean="0"/>
-              <a:t>2025-02-19</a:t>
+              <a:t>2025-02-24</a:t>
             </a:fld>
             <a:endParaRPr lang="ko-KR" altLang="en-US"/>
           </a:p>
@@ -1730,7 +1730,7 @@
           <a:p>
             <a:fld id="{4E46A2C9-9894-4DF2-AF4D-870EB97B91ED}" type="datetimeFigureOut">
               <a:rPr lang="ko-KR" altLang="en-US" smtClean="0"/>
-              <a:t>2025-02-19</a:t>
+              <a:t>2025-02-24</a:t>
             </a:fld>
             <a:endParaRPr lang="ko-KR" altLang="en-US"/>
           </a:p>
@@ -1825,7 +1825,7 @@
           <a:p>
             <a:fld id="{4E46A2C9-9894-4DF2-AF4D-870EB97B91ED}" type="datetimeFigureOut">
               <a:rPr lang="ko-KR" altLang="en-US" smtClean="0"/>
-              <a:t>2025-02-19</a:t>
+              <a:t>2025-02-24</a:t>
             </a:fld>
             <a:endParaRPr lang="ko-KR" altLang="en-US"/>
           </a:p>
@@ -2102,7 +2102,7 @@
           <a:p>
             <a:fld id="{4E46A2C9-9894-4DF2-AF4D-870EB97B91ED}" type="datetimeFigureOut">
               <a:rPr lang="ko-KR" altLang="en-US" smtClean="0"/>
-              <a:t>2025-02-19</a:t>
+              <a:t>2025-02-24</a:t>
             </a:fld>
             <a:endParaRPr lang="ko-KR" altLang="en-US"/>
           </a:p>
@@ -2355,7 +2355,7 @@
           <a:p>
             <a:fld id="{4E46A2C9-9894-4DF2-AF4D-870EB97B91ED}" type="datetimeFigureOut">
               <a:rPr lang="ko-KR" altLang="en-US" smtClean="0"/>
-              <a:t>2025-02-19</a:t>
+              <a:t>2025-02-24</a:t>
             </a:fld>
             <a:endParaRPr lang="ko-KR" altLang="en-US"/>
           </a:p>
@@ -2568,7 +2568,7 @@
           <a:p>
             <a:fld id="{4E46A2C9-9894-4DF2-AF4D-870EB97B91ED}" type="datetimeFigureOut">
               <a:rPr lang="ko-KR" altLang="en-US" smtClean="0"/>
-              <a:t>2025-02-19</a:t>
+              <a:t>2025-02-24</a:t>
             </a:fld>
             <a:endParaRPr lang="ko-KR" altLang="en-US"/>
           </a:p>
@@ -3095,7 +3095,7 @@
       </p:grpSpPr>
       <p:pic>
         <p:nvPicPr>
-          <p:cNvPr id="3" name="그림 2"/>
+          <p:cNvPr id="2" name="그림 1"/>
           <p:cNvPicPr>
             <a:picLocks noChangeAspect="1"/>
           </p:cNvPicPr>
@@ -3215,7 +3215,7 @@
       </p:grpSpPr>
       <p:pic>
         <p:nvPicPr>
-          <p:cNvPr id="2" name="그림 1"/>
+          <p:cNvPr id="3" name="그림 2"/>
           <p:cNvPicPr>
             <a:picLocks noChangeAspect="1"/>
           </p:cNvPicPr>

</xml_diff>